<commit_message>
Added CAN for BMS connection
BMS in Chevy Spark 2014 A123 battery module runs at 1000KBPS CAN
</commit_message>
<xml_diff>
--- a/CAN Wiring.pptx
+++ b/CAN Wiring.pptx
@@ -259,7 +259,7 @@
           <a:p>
             <a:fld id="{AF96A30A-94CE-4B64-8F9D-3E0AF501B07E}" type="datetimeFigureOut">
               <a:rPr lang="en-US" smtClean="0"/>
-              <a:t>12/8/2018</a:t>
+              <a:t>12/25/2018</a:t>
             </a:fld>
             <a:endParaRPr lang="en-US"/>
           </a:p>
@@ -457,7 +457,7 @@
           <a:p>
             <a:fld id="{AF96A30A-94CE-4B64-8F9D-3E0AF501B07E}" type="datetimeFigureOut">
               <a:rPr lang="en-US" smtClean="0"/>
-              <a:t>12/8/2018</a:t>
+              <a:t>12/25/2018</a:t>
             </a:fld>
             <a:endParaRPr lang="en-US"/>
           </a:p>
@@ -665,7 +665,7 @@
           <a:p>
             <a:fld id="{AF96A30A-94CE-4B64-8F9D-3E0AF501B07E}" type="datetimeFigureOut">
               <a:rPr lang="en-US" smtClean="0"/>
-              <a:t>12/8/2018</a:t>
+              <a:t>12/25/2018</a:t>
             </a:fld>
             <a:endParaRPr lang="en-US"/>
           </a:p>
@@ -863,7 +863,7 @@
           <a:p>
             <a:fld id="{AF96A30A-94CE-4B64-8F9D-3E0AF501B07E}" type="datetimeFigureOut">
               <a:rPr lang="en-US" smtClean="0"/>
-              <a:t>12/8/2018</a:t>
+              <a:t>12/25/2018</a:t>
             </a:fld>
             <a:endParaRPr lang="en-US"/>
           </a:p>
@@ -1138,7 +1138,7 @@
           <a:p>
             <a:fld id="{AF96A30A-94CE-4B64-8F9D-3E0AF501B07E}" type="datetimeFigureOut">
               <a:rPr lang="en-US" smtClean="0"/>
-              <a:t>12/8/2018</a:t>
+              <a:t>12/25/2018</a:t>
             </a:fld>
             <a:endParaRPr lang="en-US"/>
           </a:p>
@@ -1403,7 +1403,7 @@
           <a:p>
             <a:fld id="{AF96A30A-94CE-4B64-8F9D-3E0AF501B07E}" type="datetimeFigureOut">
               <a:rPr lang="en-US" smtClean="0"/>
-              <a:t>12/8/2018</a:t>
+              <a:t>12/25/2018</a:t>
             </a:fld>
             <a:endParaRPr lang="en-US"/>
           </a:p>
@@ -1815,7 +1815,7 @@
           <a:p>
             <a:fld id="{AF96A30A-94CE-4B64-8F9D-3E0AF501B07E}" type="datetimeFigureOut">
               <a:rPr lang="en-US" smtClean="0"/>
-              <a:t>12/8/2018</a:t>
+              <a:t>12/25/2018</a:t>
             </a:fld>
             <a:endParaRPr lang="en-US"/>
           </a:p>
@@ -1956,7 +1956,7 @@
           <a:p>
             <a:fld id="{AF96A30A-94CE-4B64-8F9D-3E0AF501B07E}" type="datetimeFigureOut">
               <a:rPr lang="en-US" smtClean="0"/>
-              <a:t>12/8/2018</a:t>
+              <a:t>12/25/2018</a:t>
             </a:fld>
             <a:endParaRPr lang="en-US"/>
           </a:p>
@@ -2069,7 +2069,7 @@
           <a:p>
             <a:fld id="{AF96A30A-94CE-4B64-8F9D-3E0AF501B07E}" type="datetimeFigureOut">
               <a:rPr lang="en-US" smtClean="0"/>
-              <a:t>12/8/2018</a:t>
+              <a:t>12/25/2018</a:t>
             </a:fld>
             <a:endParaRPr lang="en-US"/>
           </a:p>
@@ -2380,7 +2380,7 @@
           <a:p>
             <a:fld id="{AF96A30A-94CE-4B64-8F9D-3E0AF501B07E}" type="datetimeFigureOut">
               <a:rPr lang="en-US" smtClean="0"/>
-              <a:t>12/8/2018</a:t>
+              <a:t>12/25/2018</a:t>
             </a:fld>
             <a:endParaRPr lang="en-US"/>
           </a:p>
@@ -2668,7 +2668,7 @@
           <a:p>
             <a:fld id="{AF96A30A-94CE-4B64-8F9D-3E0AF501B07E}" type="datetimeFigureOut">
               <a:rPr lang="en-US" smtClean="0"/>
-              <a:t>12/8/2018</a:t>
+              <a:t>12/25/2018</a:t>
             </a:fld>
             <a:endParaRPr lang="en-US"/>
           </a:p>
@@ -2909,7 +2909,7 @@
           <a:p>
             <a:fld id="{AF96A30A-94CE-4B64-8F9D-3E0AF501B07E}" type="datetimeFigureOut">
               <a:rPr lang="en-US" smtClean="0"/>
-              <a:t>12/8/2018</a:t>
+              <a:t>12/25/2018</a:t>
             </a:fld>
             <a:endParaRPr lang="en-US"/>
           </a:p>
@@ -4579,7 +4579,7 @@
         </p:nvSpPr>
         <p:spPr>
           <a:xfrm>
-            <a:off x="10181690" y="3956820"/>
+            <a:off x="10156700" y="3149915"/>
             <a:ext cx="787684" cy="594632"/>
           </a:xfrm>
           <a:prstGeom prst="ellipse">
@@ -4629,11 +4629,837 @@
         </p:nvCxnSpPr>
         <p:spPr>
           <a:xfrm flipV="1">
-            <a:off x="9316948" y="4254136"/>
-            <a:ext cx="864742" cy="1934"/>
+            <a:off x="9316948" y="3447231"/>
+            <a:ext cx="839752" cy="808839"/>
           </a:xfrm>
           <a:prstGeom prst="straightConnector1">
             <a:avLst/>
+          </a:prstGeom>
+          <a:ln>
+            <a:tailEnd type="triangle"/>
+          </a:ln>
+        </p:spPr>
+        <p:style>
+          <a:lnRef idx="1">
+            <a:schemeClr val="accent2"/>
+          </a:lnRef>
+          <a:fillRef idx="0">
+            <a:schemeClr val="accent2"/>
+          </a:fillRef>
+          <a:effectRef idx="0">
+            <a:schemeClr val="accent2"/>
+          </a:effectRef>
+          <a:fontRef idx="minor">
+            <a:schemeClr val="tx1"/>
+          </a:fontRef>
+        </p:style>
+      </p:cxnSp>
+      <p:sp>
+        <p:nvSpPr>
+          <p:cNvPr id="26" name="TextBox 25">
+            <a:extLst>
+              <a:ext uri="{FF2B5EF4-FFF2-40B4-BE49-F238E27FC236}">
+                <a16:creationId xmlns:a16="http://schemas.microsoft.com/office/drawing/2014/main" id="{42BDDEB0-A130-4BEB-A9FA-EF977224D841}"/>
+              </a:ext>
+            </a:extLst>
+          </p:cNvPr>
+          <p:cNvSpPr txBox="1"/>
+          <p:nvPr/>
+        </p:nvSpPr>
+        <p:spPr>
+          <a:xfrm>
+            <a:off x="7025970" y="5155641"/>
+            <a:ext cx="1212191" cy="400110"/>
+          </a:xfrm>
+          <a:prstGeom prst="rect">
+            <a:avLst/>
+          </a:prstGeom>
+          <a:noFill/>
+        </p:spPr>
+        <p:txBody>
+          <a:bodyPr wrap="none" rtlCol="0">
+            <a:spAutoFit/>
+          </a:bodyPr>
+          <a:lstStyle/>
+          <a:p>
+            <a:r>
+              <a:rPr lang="en-US" sz="1000" dirty="0"/>
+              <a:t>Start/Stop Charging</a:t>
+            </a:r>
+          </a:p>
+          <a:p>
+            <a:r>
+              <a:rPr lang="en-US" sz="1000" dirty="0"/>
+              <a:t>Charge Settings</a:t>
+            </a:r>
+          </a:p>
+        </p:txBody>
+      </p:sp>
+      <p:sp>
+        <p:nvSpPr>
+          <p:cNvPr id="44" name="TextBox 43">
+            <a:extLst>
+              <a:ext uri="{FF2B5EF4-FFF2-40B4-BE49-F238E27FC236}">
+                <a16:creationId xmlns:a16="http://schemas.microsoft.com/office/drawing/2014/main" id="{B52CE6BA-CBC9-4882-9858-0543ACFF5C71}"/>
+              </a:ext>
+            </a:extLst>
+          </p:cNvPr>
+          <p:cNvSpPr txBox="1"/>
+          <p:nvPr/>
+        </p:nvSpPr>
+        <p:spPr>
+          <a:xfrm>
+            <a:off x="9427521" y="3581450"/>
+            <a:ext cx="787684" cy="553998"/>
+          </a:xfrm>
+          <a:prstGeom prst="rect">
+            <a:avLst/>
+          </a:prstGeom>
+          <a:noFill/>
+        </p:spPr>
+        <p:txBody>
+          <a:bodyPr wrap="square" rtlCol="0">
+            <a:spAutoFit/>
+          </a:bodyPr>
+          <a:lstStyle/>
+          <a:p>
+            <a:r>
+              <a:rPr lang="en-US" sz="1000" dirty="0"/>
+              <a:t>Contactors</a:t>
+            </a:r>
+          </a:p>
+          <a:p>
+            <a:r>
+              <a:rPr lang="en-US" sz="1000" dirty="0"/>
+              <a:t>&amp; BMS on/off</a:t>
+            </a:r>
+          </a:p>
+        </p:txBody>
+      </p:sp>
+      <p:sp>
+        <p:nvSpPr>
+          <p:cNvPr id="45" name="TextBox 44">
+            <a:extLst>
+              <a:ext uri="{FF2B5EF4-FFF2-40B4-BE49-F238E27FC236}">
+                <a16:creationId xmlns:a16="http://schemas.microsoft.com/office/drawing/2014/main" id="{AAE366A8-7BE1-4CF7-8416-D94371B0B467}"/>
+              </a:ext>
+            </a:extLst>
+          </p:cNvPr>
+          <p:cNvSpPr txBox="1"/>
+          <p:nvPr/>
+        </p:nvSpPr>
+        <p:spPr>
+          <a:xfrm>
+            <a:off x="7311230" y="4054081"/>
+            <a:ext cx="841897" cy="246221"/>
+          </a:xfrm>
+          <a:prstGeom prst="rect">
+            <a:avLst/>
+          </a:prstGeom>
+          <a:noFill/>
+        </p:spPr>
+        <p:txBody>
+          <a:bodyPr wrap="none" rtlCol="0">
+            <a:spAutoFit/>
+          </a:bodyPr>
+          <a:lstStyle/>
+          <a:p>
+            <a:r>
+              <a:rPr lang="en-US" sz="1000" dirty="0"/>
+              <a:t>Battery Data</a:t>
+            </a:r>
+          </a:p>
+        </p:txBody>
+      </p:sp>
+      <p:sp>
+        <p:nvSpPr>
+          <p:cNvPr id="51" name="TextBox 50">
+            <a:extLst>
+              <a:ext uri="{FF2B5EF4-FFF2-40B4-BE49-F238E27FC236}">
+                <a16:creationId xmlns:a16="http://schemas.microsoft.com/office/drawing/2014/main" id="{CDD847E5-C117-4322-A723-9536B99D2736}"/>
+              </a:ext>
+            </a:extLst>
+          </p:cNvPr>
+          <p:cNvSpPr txBox="1"/>
+          <p:nvPr/>
+        </p:nvSpPr>
+        <p:spPr>
+          <a:xfrm>
+            <a:off x="6378235" y="3451764"/>
+            <a:ext cx="872355" cy="400110"/>
+          </a:xfrm>
+          <a:prstGeom prst="rect">
+            <a:avLst/>
+          </a:prstGeom>
+          <a:noFill/>
+        </p:spPr>
+        <p:txBody>
+          <a:bodyPr wrap="none" rtlCol="0">
+            <a:spAutoFit/>
+          </a:bodyPr>
+          <a:lstStyle/>
+          <a:p>
+            <a:r>
+              <a:rPr lang="en-US" sz="1000" dirty="0"/>
+              <a:t>Keys and LED</a:t>
+            </a:r>
+          </a:p>
+          <a:p>
+            <a:r>
+              <a:rPr lang="en-US" sz="1000" dirty="0"/>
+              <a:t>Info/Control</a:t>
+            </a:r>
+          </a:p>
+        </p:txBody>
+      </p:sp>
+      <p:sp>
+        <p:nvSpPr>
+          <p:cNvPr id="52" name="TextBox 51">
+            <a:extLst>
+              <a:ext uri="{FF2B5EF4-FFF2-40B4-BE49-F238E27FC236}">
+                <a16:creationId xmlns:a16="http://schemas.microsoft.com/office/drawing/2014/main" id="{B6B65F47-BBEE-44AE-963C-75587951DAC3}"/>
+              </a:ext>
+            </a:extLst>
+          </p:cNvPr>
+          <p:cNvSpPr txBox="1"/>
+          <p:nvPr/>
+        </p:nvSpPr>
+        <p:spPr>
+          <a:xfrm>
+            <a:off x="5879167" y="5747570"/>
+            <a:ext cx="769763" cy="400110"/>
+          </a:xfrm>
+          <a:prstGeom prst="rect">
+            <a:avLst/>
+          </a:prstGeom>
+          <a:noFill/>
+        </p:spPr>
+        <p:txBody>
+          <a:bodyPr wrap="none" rtlCol="0">
+            <a:spAutoFit/>
+          </a:bodyPr>
+          <a:lstStyle/>
+          <a:p>
+            <a:r>
+              <a:rPr lang="en-US" sz="1000" dirty="0"/>
+              <a:t>AC &amp; Temp</a:t>
+            </a:r>
+          </a:p>
+          <a:p>
+            <a:r>
+              <a:rPr lang="en-US" sz="1000" dirty="0"/>
+              <a:t>Control</a:t>
+            </a:r>
+          </a:p>
+        </p:txBody>
+      </p:sp>
+      <p:sp>
+        <p:nvSpPr>
+          <p:cNvPr id="53" name="Oval 52">
+            <a:extLst>
+              <a:ext uri="{FF2B5EF4-FFF2-40B4-BE49-F238E27FC236}">
+                <a16:creationId xmlns:a16="http://schemas.microsoft.com/office/drawing/2014/main" id="{5FFCA267-07BF-4594-B440-51BFA8F8F384}"/>
+              </a:ext>
+            </a:extLst>
+          </p:cNvPr>
+          <p:cNvSpPr/>
+          <p:nvPr/>
+        </p:nvSpPr>
+        <p:spPr>
+          <a:xfrm>
+            <a:off x="10213241" y="5858189"/>
+            <a:ext cx="787684" cy="594632"/>
+          </a:xfrm>
+          <a:prstGeom prst="ellipse">
+            <a:avLst/>
+          </a:prstGeom>
+        </p:spPr>
+        <p:style>
+          <a:lnRef idx="2">
+            <a:schemeClr val="accent1"/>
+          </a:lnRef>
+          <a:fillRef idx="1">
+            <a:schemeClr val="lt1"/>
+          </a:fillRef>
+          <a:effectRef idx="0">
+            <a:schemeClr val="accent1"/>
+          </a:effectRef>
+          <a:fontRef idx="minor">
+            <a:schemeClr val="dk1"/>
+          </a:fontRef>
+        </p:style>
+        <p:txBody>
+          <a:bodyPr wrap="none" lIns="0" tIns="0" rIns="0" bIns="0" rtlCol="0" anchor="ctr"/>
+          <a:lstStyle/>
+          <a:p>
+            <a:pPr algn="ctr"/>
+            <a:r>
+              <a:rPr lang="en-US" sz="1000" dirty="0"/>
+              <a:t>Blend Door</a:t>
+            </a:r>
+          </a:p>
+          <a:p>
+            <a:pPr algn="ctr"/>
+            <a:r>
+              <a:rPr lang="en-US" sz="1000" dirty="0"/>
+              <a:t>Actuators</a:t>
+            </a:r>
+          </a:p>
+        </p:txBody>
+      </p:sp>
+      <p:cxnSp>
+        <p:nvCxnSpPr>
+          <p:cNvPr id="36" name="Straight Arrow Connector 35">
+            <a:extLst>
+              <a:ext uri="{FF2B5EF4-FFF2-40B4-BE49-F238E27FC236}">
+                <a16:creationId xmlns:a16="http://schemas.microsoft.com/office/drawing/2014/main" id="{064428DF-7C90-4D11-9613-2FE614CC1AC1}"/>
+              </a:ext>
+            </a:extLst>
+          </p:cNvPr>
+          <p:cNvCxnSpPr>
+            <a:stCxn id="41" idx="3"/>
+            <a:endCxn id="53" idx="2"/>
+          </p:cNvCxnSpPr>
+          <p:nvPr/>
+        </p:nvCxnSpPr>
+        <p:spPr>
+          <a:xfrm>
+            <a:off x="7868291" y="6155505"/>
+            <a:ext cx="2344950" cy="0"/>
+          </a:xfrm>
+          <a:prstGeom prst="straightConnector1">
+            <a:avLst/>
+          </a:prstGeom>
+          <a:ln>
+            <a:tailEnd type="triangle"/>
+          </a:ln>
+        </p:spPr>
+        <p:style>
+          <a:lnRef idx="1">
+            <a:schemeClr val="accent2"/>
+          </a:lnRef>
+          <a:fillRef idx="0">
+            <a:schemeClr val="accent2"/>
+          </a:fillRef>
+          <a:effectRef idx="0">
+            <a:schemeClr val="accent2"/>
+          </a:effectRef>
+          <a:fontRef idx="minor">
+            <a:schemeClr val="tx1"/>
+          </a:fontRef>
+        </p:style>
+      </p:cxnSp>
+      <p:sp>
+        <p:nvSpPr>
+          <p:cNvPr id="54" name="TextBox 53">
+            <a:extLst>
+              <a:ext uri="{FF2B5EF4-FFF2-40B4-BE49-F238E27FC236}">
+                <a16:creationId xmlns:a16="http://schemas.microsoft.com/office/drawing/2014/main" id="{2BC437A9-24EF-4164-96B3-D7D54499B0E6}"/>
+              </a:ext>
+            </a:extLst>
+          </p:cNvPr>
+          <p:cNvSpPr txBox="1"/>
+          <p:nvPr/>
+        </p:nvSpPr>
+        <p:spPr>
+          <a:xfrm>
+            <a:off x="3211157" y="5347460"/>
+            <a:ext cx="1348446" cy="400110"/>
+          </a:xfrm>
+          <a:prstGeom prst="rect">
+            <a:avLst/>
+          </a:prstGeom>
+          <a:noFill/>
+        </p:spPr>
+        <p:txBody>
+          <a:bodyPr wrap="none" rtlCol="0">
+            <a:spAutoFit/>
+          </a:bodyPr>
+          <a:lstStyle/>
+          <a:p>
+            <a:r>
+              <a:rPr lang="en-US" sz="1000" dirty="0"/>
+              <a:t>Speed, Torque, Temps</a:t>
+            </a:r>
+          </a:p>
+          <a:p>
+            <a:r>
+              <a:rPr lang="en-US" sz="1000" dirty="0"/>
+              <a:t>Voltages, Warnings</a:t>
+            </a:r>
+          </a:p>
+        </p:txBody>
+      </p:sp>
+      <p:sp>
+        <p:nvSpPr>
+          <p:cNvPr id="55" name="TextBox 54">
+            <a:extLst>
+              <a:ext uri="{FF2B5EF4-FFF2-40B4-BE49-F238E27FC236}">
+                <a16:creationId xmlns:a16="http://schemas.microsoft.com/office/drawing/2014/main" id="{E73C109B-2C86-401F-B0B8-0BE948DB559F}"/>
+              </a:ext>
+            </a:extLst>
+          </p:cNvPr>
+          <p:cNvSpPr txBox="1"/>
+          <p:nvPr/>
+        </p:nvSpPr>
+        <p:spPr>
+          <a:xfrm>
+            <a:off x="3233368" y="4054081"/>
+            <a:ext cx="1348446" cy="400110"/>
+          </a:xfrm>
+          <a:prstGeom prst="rect">
+            <a:avLst/>
+          </a:prstGeom>
+          <a:noFill/>
+        </p:spPr>
+        <p:txBody>
+          <a:bodyPr wrap="none" rtlCol="0">
+            <a:spAutoFit/>
+          </a:bodyPr>
+          <a:lstStyle/>
+          <a:p>
+            <a:r>
+              <a:rPr lang="en-US" sz="1000" dirty="0"/>
+              <a:t>Speed, Torque, Temps</a:t>
+            </a:r>
+          </a:p>
+          <a:p>
+            <a:r>
+              <a:rPr lang="en-US" sz="1000" dirty="0"/>
+              <a:t>Voltages, Warnings</a:t>
+            </a:r>
+          </a:p>
+        </p:txBody>
+      </p:sp>
+      <p:sp>
+        <p:nvSpPr>
+          <p:cNvPr id="56" name="Oval 55">
+            <a:extLst>
+              <a:ext uri="{FF2B5EF4-FFF2-40B4-BE49-F238E27FC236}">
+                <a16:creationId xmlns:a16="http://schemas.microsoft.com/office/drawing/2014/main" id="{6D6EEDD4-FC7E-4B01-A5E0-727A67836101}"/>
+              </a:ext>
+            </a:extLst>
+          </p:cNvPr>
+          <p:cNvSpPr/>
+          <p:nvPr/>
+        </p:nvSpPr>
+        <p:spPr>
+          <a:xfrm>
+            <a:off x="444512" y="2879199"/>
+            <a:ext cx="787684" cy="594632"/>
+          </a:xfrm>
+          <a:prstGeom prst="ellipse">
+            <a:avLst/>
+          </a:prstGeom>
+        </p:spPr>
+        <p:style>
+          <a:lnRef idx="2">
+            <a:schemeClr val="accent1"/>
+          </a:lnRef>
+          <a:fillRef idx="1">
+            <a:schemeClr val="lt1"/>
+          </a:fillRef>
+          <a:effectRef idx="0">
+            <a:schemeClr val="accent1"/>
+          </a:effectRef>
+          <a:fontRef idx="minor">
+            <a:schemeClr val="dk1"/>
+          </a:fontRef>
+        </p:style>
+        <p:txBody>
+          <a:bodyPr wrap="none" lIns="0" tIns="0" rIns="0" bIns="0" rtlCol="0" anchor="ctr"/>
+          <a:lstStyle/>
+          <a:p>
+            <a:pPr algn="ctr"/>
+            <a:r>
+              <a:rPr lang="en-US" sz="1000" dirty="0"/>
+              <a:t>Pumps and</a:t>
+            </a:r>
+          </a:p>
+          <a:p>
+            <a:pPr algn="ctr"/>
+            <a:r>
+              <a:rPr lang="en-US" sz="1000" dirty="0"/>
+              <a:t>Valves</a:t>
+            </a:r>
+          </a:p>
+        </p:txBody>
+      </p:sp>
+      <p:sp>
+        <p:nvSpPr>
+          <p:cNvPr id="57" name="Oval 56">
+            <a:extLst>
+              <a:ext uri="{FF2B5EF4-FFF2-40B4-BE49-F238E27FC236}">
+                <a16:creationId xmlns:a16="http://schemas.microsoft.com/office/drawing/2014/main" id="{EB9EFD36-19D8-4AF4-8E92-0B55E6CFFFC2}"/>
+              </a:ext>
+            </a:extLst>
+          </p:cNvPr>
+          <p:cNvSpPr/>
+          <p:nvPr/>
+        </p:nvSpPr>
+        <p:spPr>
+          <a:xfrm>
+            <a:off x="444512" y="3651819"/>
+            <a:ext cx="787684" cy="594632"/>
+          </a:xfrm>
+          <a:prstGeom prst="ellipse">
+            <a:avLst/>
+          </a:prstGeom>
+        </p:spPr>
+        <p:style>
+          <a:lnRef idx="2">
+            <a:schemeClr val="accent1"/>
+          </a:lnRef>
+          <a:fillRef idx="1">
+            <a:schemeClr val="lt1"/>
+          </a:fillRef>
+          <a:effectRef idx="0">
+            <a:schemeClr val="accent1"/>
+          </a:effectRef>
+          <a:fontRef idx="minor">
+            <a:schemeClr val="dk1"/>
+          </a:fontRef>
+        </p:style>
+        <p:txBody>
+          <a:bodyPr wrap="none" lIns="0" tIns="0" rIns="0" bIns="0" rtlCol="0" anchor="ctr"/>
+          <a:lstStyle/>
+          <a:p>
+            <a:pPr algn="ctr"/>
+            <a:r>
+              <a:rPr lang="en-US" sz="1000" dirty="0"/>
+              <a:t>AC</a:t>
+            </a:r>
+          </a:p>
+          <a:p>
+            <a:pPr algn="ctr"/>
+            <a:r>
+              <a:rPr lang="en-US" sz="1000" dirty="0"/>
+              <a:t>Compressor</a:t>
+            </a:r>
+          </a:p>
+        </p:txBody>
+      </p:sp>
+      <p:sp>
+        <p:nvSpPr>
+          <p:cNvPr id="58" name="Oval 57">
+            <a:extLst>
+              <a:ext uri="{FF2B5EF4-FFF2-40B4-BE49-F238E27FC236}">
+                <a16:creationId xmlns:a16="http://schemas.microsoft.com/office/drawing/2014/main" id="{771E0191-AC6E-4091-8E91-BA09160FAFA3}"/>
+              </a:ext>
+            </a:extLst>
+          </p:cNvPr>
+          <p:cNvSpPr/>
+          <p:nvPr/>
+        </p:nvSpPr>
+        <p:spPr>
+          <a:xfrm>
+            <a:off x="448669" y="4431365"/>
+            <a:ext cx="787684" cy="594632"/>
+          </a:xfrm>
+          <a:prstGeom prst="ellipse">
+            <a:avLst/>
+          </a:prstGeom>
+        </p:spPr>
+        <p:style>
+          <a:lnRef idx="2">
+            <a:schemeClr val="accent1"/>
+          </a:lnRef>
+          <a:fillRef idx="1">
+            <a:schemeClr val="lt1"/>
+          </a:fillRef>
+          <a:effectRef idx="0">
+            <a:schemeClr val="accent1"/>
+          </a:effectRef>
+          <a:fontRef idx="minor">
+            <a:schemeClr val="dk1"/>
+          </a:fontRef>
+        </p:style>
+        <p:txBody>
+          <a:bodyPr wrap="none" lIns="0" tIns="0" rIns="0" bIns="0" rtlCol="0" anchor="ctr"/>
+          <a:lstStyle/>
+          <a:p>
+            <a:pPr algn="ctr"/>
+            <a:r>
+              <a:rPr lang="en-US" sz="1000" dirty="0"/>
+              <a:t>Chiller &amp; </a:t>
+            </a:r>
+          </a:p>
+          <a:p>
+            <a:pPr algn="ctr"/>
+            <a:r>
+              <a:rPr lang="en-US" sz="1000" dirty="0"/>
+              <a:t>Heater</a:t>
+            </a:r>
+          </a:p>
+        </p:txBody>
+      </p:sp>
+      <p:cxnSp>
+        <p:nvCxnSpPr>
+          <p:cNvPr id="42" name="Connector: Elbow 41">
+            <a:extLst>
+              <a:ext uri="{FF2B5EF4-FFF2-40B4-BE49-F238E27FC236}">
+                <a16:creationId xmlns:a16="http://schemas.microsoft.com/office/drawing/2014/main" id="{6378F1D6-F74F-4AFF-B4F6-F0A53BF4B02D}"/>
+              </a:ext>
+            </a:extLst>
+          </p:cNvPr>
+          <p:cNvCxnSpPr>
+            <a:stCxn id="21" idx="1"/>
+            <a:endCxn id="58" idx="6"/>
+          </p:cNvCxnSpPr>
+          <p:nvPr/>
+        </p:nvCxnSpPr>
+        <p:spPr>
+          <a:xfrm rot="10800000" flipV="1">
+            <a:off x="1236353" y="4256069"/>
+            <a:ext cx="825328" cy="472611"/>
+          </a:xfrm>
+          <a:prstGeom prst="bentConnector3">
+            <a:avLst/>
+          </a:prstGeom>
+          <a:ln>
+            <a:tailEnd type="triangle"/>
+          </a:ln>
+        </p:spPr>
+        <p:style>
+          <a:lnRef idx="1">
+            <a:schemeClr val="accent2"/>
+          </a:lnRef>
+          <a:fillRef idx="0">
+            <a:schemeClr val="accent2"/>
+          </a:fillRef>
+          <a:effectRef idx="0">
+            <a:schemeClr val="accent2"/>
+          </a:effectRef>
+          <a:fontRef idx="minor">
+            <a:schemeClr val="tx1"/>
+          </a:fontRef>
+        </p:style>
+      </p:cxnSp>
+      <p:cxnSp>
+        <p:nvCxnSpPr>
+          <p:cNvPr id="60" name="Connector: Elbow 59">
+            <a:extLst>
+              <a:ext uri="{FF2B5EF4-FFF2-40B4-BE49-F238E27FC236}">
+                <a16:creationId xmlns:a16="http://schemas.microsoft.com/office/drawing/2014/main" id="{2664DC72-57C5-406C-9CAA-D4B5BF6A8AC7}"/>
+              </a:ext>
+            </a:extLst>
+          </p:cNvPr>
+          <p:cNvCxnSpPr>
+            <a:stCxn id="21" idx="1"/>
+            <a:endCxn id="57" idx="6"/>
+          </p:cNvCxnSpPr>
+          <p:nvPr/>
+        </p:nvCxnSpPr>
+        <p:spPr>
+          <a:xfrm rot="10800000">
+            <a:off x="1232197" y="3949136"/>
+            <a:ext cx="829485" cy="306935"/>
+          </a:xfrm>
+          <a:prstGeom prst="bentConnector3">
+            <a:avLst/>
+          </a:prstGeom>
+          <a:ln>
+            <a:tailEnd type="triangle"/>
+          </a:ln>
+        </p:spPr>
+        <p:style>
+          <a:lnRef idx="1">
+            <a:schemeClr val="accent2"/>
+          </a:lnRef>
+          <a:fillRef idx="0">
+            <a:schemeClr val="accent2"/>
+          </a:fillRef>
+          <a:effectRef idx="0">
+            <a:schemeClr val="accent2"/>
+          </a:effectRef>
+          <a:fontRef idx="minor">
+            <a:schemeClr val="tx1"/>
+          </a:fontRef>
+        </p:style>
+      </p:cxnSp>
+      <p:cxnSp>
+        <p:nvCxnSpPr>
+          <p:cNvPr id="62" name="Connector: Elbow 61">
+            <a:extLst>
+              <a:ext uri="{FF2B5EF4-FFF2-40B4-BE49-F238E27FC236}">
+                <a16:creationId xmlns:a16="http://schemas.microsoft.com/office/drawing/2014/main" id="{3AC739E7-2560-4191-8EA3-5D3D77FB87B7}"/>
+              </a:ext>
+            </a:extLst>
+          </p:cNvPr>
+          <p:cNvCxnSpPr>
+            <a:stCxn id="21" idx="1"/>
+            <a:endCxn id="56" idx="6"/>
+          </p:cNvCxnSpPr>
+          <p:nvPr/>
+        </p:nvCxnSpPr>
+        <p:spPr>
+          <a:xfrm rot="10800000">
+            <a:off x="1232197" y="3176516"/>
+            <a:ext cx="829485" cy="1079555"/>
+          </a:xfrm>
+          <a:prstGeom prst="bentConnector3">
+            <a:avLst/>
+          </a:prstGeom>
+          <a:ln>
+            <a:tailEnd type="triangle"/>
+          </a:ln>
+        </p:spPr>
+        <p:style>
+          <a:lnRef idx="1">
+            <a:schemeClr val="accent2"/>
+          </a:lnRef>
+          <a:fillRef idx="0">
+            <a:schemeClr val="accent2"/>
+          </a:fillRef>
+          <a:effectRef idx="0">
+            <a:schemeClr val="accent2"/>
+          </a:effectRef>
+          <a:fontRef idx="minor">
+            <a:schemeClr val="tx1"/>
+          </a:fontRef>
+        </p:style>
+      </p:cxnSp>
+      <p:sp>
+        <p:nvSpPr>
+          <p:cNvPr id="50" name="TextBox 49">
+            <a:extLst>
+              <a:ext uri="{FF2B5EF4-FFF2-40B4-BE49-F238E27FC236}">
+                <a16:creationId xmlns:a16="http://schemas.microsoft.com/office/drawing/2014/main" id="{FF330DD5-41E0-4068-89B1-4756388B4871}"/>
+              </a:ext>
+            </a:extLst>
+          </p:cNvPr>
+          <p:cNvSpPr txBox="1"/>
+          <p:nvPr/>
+        </p:nvSpPr>
+        <p:spPr>
+          <a:xfrm>
+            <a:off x="5522840" y="2158405"/>
+            <a:ext cx="439544" cy="246221"/>
+          </a:xfrm>
+          <a:prstGeom prst="rect">
+            <a:avLst/>
+          </a:prstGeom>
+          <a:noFill/>
+        </p:spPr>
+        <p:txBody>
+          <a:bodyPr wrap="none" rtlCol="0">
+            <a:spAutoFit/>
+          </a:bodyPr>
+          <a:lstStyle/>
+          <a:p>
+            <a:r>
+              <a:rPr lang="en-US" sz="1000" dirty="0"/>
+              <a:t>500k</a:t>
+            </a:r>
+          </a:p>
+        </p:txBody>
+      </p:sp>
+      <p:sp>
+        <p:nvSpPr>
+          <p:cNvPr id="59" name="TextBox 58">
+            <a:extLst>
+              <a:ext uri="{FF2B5EF4-FFF2-40B4-BE49-F238E27FC236}">
+                <a16:creationId xmlns:a16="http://schemas.microsoft.com/office/drawing/2014/main" id="{034BF4BF-C900-4851-8941-25CC94F2B5F3}"/>
+              </a:ext>
+            </a:extLst>
+          </p:cNvPr>
+          <p:cNvSpPr txBox="1"/>
+          <p:nvPr/>
+        </p:nvSpPr>
+        <p:spPr>
+          <a:xfrm>
+            <a:off x="5591984" y="3873829"/>
+            <a:ext cx="439544" cy="246221"/>
+          </a:xfrm>
+          <a:prstGeom prst="rect">
+            <a:avLst/>
+          </a:prstGeom>
+          <a:noFill/>
+        </p:spPr>
+        <p:txBody>
+          <a:bodyPr wrap="none" rtlCol="0">
+            <a:spAutoFit/>
+          </a:bodyPr>
+          <a:lstStyle/>
+          <a:p>
+            <a:r>
+              <a:rPr lang="en-US" sz="1000" dirty="0"/>
+              <a:t>500k</a:t>
+            </a:r>
+          </a:p>
+        </p:txBody>
+      </p:sp>
+      <p:sp>
+        <p:nvSpPr>
+          <p:cNvPr id="61" name="Oval 60">
+            <a:extLst>
+              <a:ext uri="{FF2B5EF4-FFF2-40B4-BE49-F238E27FC236}">
+                <a16:creationId xmlns:a16="http://schemas.microsoft.com/office/drawing/2014/main" id="{F8A1EBC1-09F3-4ED7-82E5-EC7012A2370F}"/>
+              </a:ext>
+            </a:extLst>
+          </p:cNvPr>
+          <p:cNvSpPr/>
+          <p:nvPr/>
+        </p:nvSpPr>
+        <p:spPr>
+          <a:xfrm>
+            <a:off x="10176188" y="4790947"/>
+            <a:ext cx="787684" cy="594632"/>
+          </a:xfrm>
+          <a:prstGeom prst="ellipse">
+            <a:avLst/>
+          </a:prstGeom>
+        </p:spPr>
+        <p:style>
+          <a:lnRef idx="2">
+            <a:schemeClr val="accent1"/>
+          </a:lnRef>
+          <a:fillRef idx="1">
+            <a:schemeClr val="lt1"/>
+          </a:fillRef>
+          <a:effectRef idx="0">
+            <a:schemeClr val="accent1"/>
+          </a:effectRef>
+          <a:fontRef idx="minor">
+            <a:schemeClr val="dk1"/>
+          </a:fontRef>
+        </p:style>
+        <p:txBody>
+          <a:bodyPr wrap="none" lIns="0" tIns="0" rIns="0" bIns="0" rtlCol="0" anchor="ctr"/>
+          <a:lstStyle/>
+          <a:p>
+            <a:pPr algn="ctr"/>
+            <a:r>
+              <a:rPr lang="en-US" sz="1000" dirty="0"/>
+              <a:t>BMS</a:t>
+            </a:r>
+          </a:p>
+        </p:txBody>
+      </p:sp>
+      <p:cxnSp>
+        <p:nvCxnSpPr>
+          <p:cNvPr id="4" name="Connector: Elbow 3">
+            <a:extLst>
+              <a:ext uri="{FF2B5EF4-FFF2-40B4-BE49-F238E27FC236}">
+                <a16:creationId xmlns:a16="http://schemas.microsoft.com/office/drawing/2014/main" id="{E326824E-F48C-4108-AB35-D2954DDEA12B}"/>
+              </a:ext>
+            </a:extLst>
+          </p:cNvPr>
+          <p:cNvCxnSpPr>
+            <a:stCxn id="24" idx="3"/>
+            <a:endCxn id="61" idx="2"/>
+          </p:cNvCxnSpPr>
+          <p:nvPr/>
+        </p:nvCxnSpPr>
+        <p:spPr>
+          <a:xfrm>
+            <a:off x="9316948" y="4256070"/>
+            <a:ext cx="859240" cy="832193"/>
+          </a:xfrm>
+          <a:prstGeom prst="bentConnector3">
+            <a:avLst>
+              <a:gd name="adj1" fmla="val 21070"/>
+            </a:avLst>
           </a:prstGeom>
           <a:ln>
             <a:tailEnd type="triangle"/>
@@ -4656,10 +5482,10 @@
       </p:cxnSp>
       <p:sp>
         <p:nvSpPr>
-          <p:cNvPr id="26" name="TextBox 25">
-            <a:extLst>
-              <a:ext uri="{FF2B5EF4-FFF2-40B4-BE49-F238E27FC236}">
-                <a16:creationId xmlns:a16="http://schemas.microsoft.com/office/drawing/2014/main" id="{42BDDEB0-A130-4BEB-A9FA-EF977224D841}"/>
+          <p:cNvPr id="63" name="TextBox 62">
+            <a:extLst>
+              <a:ext uri="{FF2B5EF4-FFF2-40B4-BE49-F238E27FC236}">
+                <a16:creationId xmlns:a16="http://schemas.microsoft.com/office/drawing/2014/main" id="{0D5A635C-3839-4231-BFCC-64D4A23BF124}"/>
               </a:ext>
             </a:extLst>
           </p:cNvPr>
@@ -4668,8 +5494,8 @@
         </p:nvSpPr>
         <p:spPr>
           <a:xfrm>
-            <a:off x="7025970" y="5155641"/>
-            <a:ext cx="1212191" cy="400110"/>
+            <a:off x="9596927" y="4842980"/>
+            <a:ext cx="505267" cy="246221"/>
           </a:xfrm>
           <a:prstGeom prst="rect">
             <a:avLst/>
@@ -4684,23 +5510,17 @@
           <a:p>
             <a:r>
               <a:rPr lang="en-US" sz="1000" dirty="0"/>
-              <a:t>Start/Stop Charging</a:t>
-            </a:r>
-          </a:p>
-          <a:p>
-            <a:r>
-              <a:rPr lang="en-US" sz="1000" dirty="0"/>
-              <a:t>Charge Settings</a:t>
-            </a:r>
-          </a:p>
-        </p:txBody>
-      </p:sp>
-      <p:sp>
-        <p:nvSpPr>
-          <p:cNvPr id="44" name="TextBox 43">
-            <a:extLst>
-              <a:ext uri="{FF2B5EF4-FFF2-40B4-BE49-F238E27FC236}">
-                <a16:creationId xmlns:a16="http://schemas.microsoft.com/office/drawing/2014/main" id="{B52CE6BA-CBC9-4882-9858-0543ACFF5C71}"/>
+              <a:t>1000k</a:t>
+            </a:r>
+          </a:p>
+        </p:txBody>
+      </p:sp>
+      <p:sp>
+        <p:nvSpPr>
+          <p:cNvPr id="64" name="TextBox 63">
+            <a:extLst>
+              <a:ext uri="{FF2B5EF4-FFF2-40B4-BE49-F238E27FC236}">
+                <a16:creationId xmlns:a16="http://schemas.microsoft.com/office/drawing/2014/main" id="{62406835-ABB4-4B69-B0E6-3CA50AB23F5F}"/>
               </a:ext>
             </a:extLst>
           </p:cNvPr>
@@ -4709,8 +5529,8 @@
         </p:nvSpPr>
         <p:spPr>
           <a:xfrm>
-            <a:off x="9278185" y="4054081"/>
-            <a:ext cx="898003" cy="400110"/>
+            <a:off x="9395332" y="5069667"/>
+            <a:ext cx="817853" cy="276999"/>
           </a:xfrm>
           <a:prstGeom prst="rect">
             <a:avLst/>
@@ -4724,24 +5544,22 @@
           <a:lstStyle/>
           <a:p>
             <a:r>
-              <a:rPr lang="en-US" sz="1000" dirty="0"/>
-              <a:t>Contactors</a:t>
-            </a:r>
-          </a:p>
-          <a:p>
-            <a:r>
-              <a:rPr lang="en-US" sz="1000" dirty="0"/>
-              <a:t>&amp; BMS on/off</a:t>
-            </a:r>
-          </a:p>
-        </p:txBody>
-      </p:sp>
-      <p:sp>
-        <p:nvSpPr>
-          <p:cNvPr id="45" name="TextBox 44">
-            <a:extLst>
-              <a:ext uri="{FF2B5EF4-FFF2-40B4-BE49-F238E27FC236}">
-                <a16:creationId xmlns:a16="http://schemas.microsoft.com/office/drawing/2014/main" id="{AAE366A8-7BE1-4CF7-8416-D94371B0B467}"/>
+              <a:rPr lang="en-US" sz="1200" dirty="0">
+                <a:solidFill>
+                  <a:srgbClr val="0070C0"/>
+                </a:solidFill>
+              </a:rPr>
+              <a:t>CAN_BMS</a:t>
+            </a:r>
+          </a:p>
+        </p:txBody>
+      </p:sp>
+      <p:sp>
+        <p:nvSpPr>
+          <p:cNvPr id="65" name="TextBox 64">
+            <a:extLst>
+              <a:ext uri="{FF2B5EF4-FFF2-40B4-BE49-F238E27FC236}">
+                <a16:creationId xmlns:a16="http://schemas.microsoft.com/office/drawing/2014/main" id="{0FD0BC9B-DD5F-49C0-8F4A-E01B6E0B0C39}"/>
               </a:ext>
             </a:extLst>
           </p:cNvPr>
@@ -4750,8 +5568,8 @@
         </p:nvSpPr>
         <p:spPr>
           <a:xfrm>
-            <a:off x="7311230" y="4054081"/>
-            <a:ext cx="841897" cy="246221"/>
+            <a:off x="8647570" y="5956869"/>
+            <a:ext cx="787684" cy="400110"/>
           </a:xfrm>
           <a:prstGeom prst="rect">
             <a:avLst/>
@@ -4759,24 +5577,24 @@
           <a:noFill/>
         </p:spPr>
         <p:txBody>
-          <a:bodyPr wrap="none" rtlCol="0">
+          <a:bodyPr wrap="square" rtlCol="0">
             <a:spAutoFit/>
           </a:bodyPr>
           <a:lstStyle/>
           <a:p>
             <a:r>
               <a:rPr lang="en-US" sz="1000" dirty="0"/>
-              <a:t>Battery Data</a:t>
-            </a:r>
-          </a:p>
-        </p:txBody>
-      </p:sp>
-      <p:sp>
-        <p:nvSpPr>
-          <p:cNvPr id="51" name="TextBox 50">
-            <a:extLst>
-              <a:ext uri="{FF2B5EF4-FFF2-40B4-BE49-F238E27FC236}">
-                <a16:creationId xmlns:a16="http://schemas.microsoft.com/office/drawing/2014/main" id="{CDD847E5-C117-4322-A723-9536B99D2736}"/>
+              <a:t>Control Lines</a:t>
+            </a:r>
+          </a:p>
+        </p:txBody>
+      </p:sp>
+      <p:sp>
+        <p:nvSpPr>
+          <p:cNvPr id="66" name="TextBox 65">
+            <a:extLst>
+              <a:ext uri="{FF2B5EF4-FFF2-40B4-BE49-F238E27FC236}">
+                <a16:creationId xmlns:a16="http://schemas.microsoft.com/office/drawing/2014/main" id="{1F20BD80-67E9-4FDD-98D4-CFDF6F3CECAA}"/>
               </a:ext>
             </a:extLst>
           </p:cNvPr>
@@ -4785,8 +5603,8 @@
         </p:nvSpPr>
         <p:spPr>
           <a:xfrm>
-            <a:off x="6378235" y="3451764"/>
-            <a:ext cx="872355" cy="400110"/>
+            <a:off x="1377746" y="3738919"/>
+            <a:ext cx="787684" cy="400110"/>
           </a:xfrm>
           <a:prstGeom prst="rect">
             <a:avLst/>
@@ -4794,597 +5612,14 @@
           <a:noFill/>
         </p:spPr>
         <p:txBody>
-          <a:bodyPr wrap="none" rtlCol="0">
+          <a:bodyPr wrap="square" rtlCol="0">
             <a:spAutoFit/>
           </a:bodyPr>
           <a:lstStyle/>
           <a:p>
             <a:r>
               <a:rPr lang="en-US" sz="1000" dirty="0"/>
-              <a:t>Keys and LED</a:t>
-            </a:r>
-          </a:p>
-          <a:p>
-            <a:r>
-              <a:rPr lang="en-US" sz="1000" dirty="0"/>
-              <a:t>Info/Control</a:t>
-            </a:r>
-          </a:p>
-        </p:txBody>
-      </p:sp>
-      <p:sp>
-        <p:nvSpPr>
-          <p:cNvPr id="52" name="TextBox 51">
-            <a:extLst>
-              <a:ext uri="{FF2B5EF4-FFF2-40B4-BE49-F238E27FC236}">
-                <a16:creationId xmlns:a16="http://schemas.microsoft.com/office/drawing/2014/main" id="{B6B65F47-BBEE-44AE-963C-75587951DAC3}"/>
-              </a:ext>
-            </a:extLst>
-          </p:cNvPr>
-          <p:cNvSpPr txBox="1"/>
-          <p:nvPr/>
-        </p:nvSpPr>
-        <p:spPr>
-          <a:xfrm>
-            <a:off x="5879167" y="5747570"/>
-            <a:ext cx="769763" cy="400110"/>
-          </a:xfrm>
-          <a:prstGeom prst="rect">
-            <a:avLst/>
-          </a:prstGeom>
-          <a:noFill/>
-        </p:spPr>
-        <p:txBody>
-          <a:bodyPr wrap="none" rtlCol="0">
-            <a:spAutoFit/>
-          </a:bodyPr>
-          <a:lstStyle/>
-          <a:p>
-            <a:r>
-              <a:rPr lang="en-US" sz="1000" dirty="0"/>
-              <a:t>AC &amp; Temp</a:t>
-            </a:r>
-          </a:p>
-          <a:p>
-            <a:r>
-              <a:rPr lang="en-US" sz="1000" dirty="0"/>
-              <a:t>Control</a:t>
-            </a:r>
-          </a:p>
-        </p:txBody>
-      </p:sp>
-      <p:sp>
-        <p:nvSpPr>
-          <p:cNvPr id="53" name="Oval 52">
-            <a:extLst>
-              <a:ext uri="{FF2B5EF4-FFF2-40B4-BE49-F238E27FC236}">
-                <a16:creationId xmlns:a16="http://schemas.microsoft.com/office/drawing/2014/main" id="{5FFCA267-07BF-4594-B440-51BFA8F8F384}"/>
-              </a:ext>
-            </a:extLst>
-          </p:cNvPr>
-          <p:cNvSpPr/>
-          <p:nvPr/>
-        </p:nvSpPr>
-        <p:spPr>
-          <a:xfrm>
-            <a:off x="10213241" y="5858189"/>
-            <a:ext cx="787684" cy="594632"/>
-          </a:xfrm>
-          <a:prstGeom prst="ellipse">
-            <a:avLst/>
-          </a:prstGeom>
-        </p:spPr>
-        <p:style>
-          <a:lnRef idx="2">
-            <a:schemeClr val="accent1"/>
-          </a:lnRef>
-          <a:fillRef idx="1">
-            <a:schemeClr val="lt1"/>
-          </a:fillRef>
-          <a:effectRef idx="0">
-            <a:schemeClr val="accent1"/>
-          </a:effectRef>
-          <a:fontRef idx="minor">
-            <a:schemeClr val="dk1"/>
-          </a:fontRef>
-        </p:style>
-        <p:txBody>
-          <a:bodyPr wrap="none" lIns="0" tIns="0" rIns="0" bIns="0" rtlCol="0" anchor="ctr"/>
-          <a:lstStyle/>
-          <a:p>
-            <a:pPr algn="ctr"/>
-            <a:r>
-              <a:rPr lang="en-US" sz="1000" dirty="0"/>
-              <a:t>Blend Door</a:t>
-            </a:r>
-          </a:p>
-          <a:p>
-            <a:pPr algn="ctr"/>
-            <a:r>
-              <a:rPr lang="en-US" sz="1000" dirty="0"/>
-              <a:t>Actuators</a:t>
-            </a:r>
-          </a:p>
-        </p:txBody>
-      </p:sp>
-      <p:cxnSp>
-        <p:nvCxnSpPr>
-          <p:cNvPr id="36" name="Straight Arrow Connector 35">
-            <a:extLst>
-              <a:ext uri="{FF2B5EF4-FFF2-40B4-BE49-F238E27FC236}">
-                <a16:creationId xmlns:a16="http://schemas.microsoft.com/office/drawing/2014/main" id="{064428DF-7C90-4D11-9613-2FE614CC1AC1}"/>
-              </a:ext>
-            </a:extLst>
-          </p:cNvPr>
-          <p:cNvCxnSpPr>
-            <a:stCxn id="41" idx="3"/>
-            <a:endCxn id="53" idx="2"/>
-          </p:cNvCxnSpPr>
-          <p:nvPr/>
-        </p:nvCxnSpPr>
-        <p:spPr>
-          <a:xfrm>
-            <a:off x="7868291" y="6155505"/>
-            <a:ext cx="2344950" cy="0"/>
-          </a:xfrm>
-          <a:prstGeom prst="straightConnector1">
-            <a:avLst/>
-          </a:prstGeom>
-          <a:ln>
-            <a:tailEnd type="triangle"/>
-          </a:ln>
-        </p:spPr>
-        <p:style>
-          <a:lnRef idx="1">
-            <a:schemeClr val="accent1"/>
-          </a:lnRef>
-          <a:fillRef idx="0">
-            <a:schemeClr val="accent1"/>
-          </a:fillRef>
-          <a:effectRef idx="0">
-            <a:schemeClr val="accent1"/>
-          </a:effectRef>
-          <a:fontRef idx="minor">
-            <a:schemeClr val="tx1"/>
-          </a:fontRef>
-        </p:style>
-      </p:cxnSp>
-      <p:sp>
-        <p:nvSpPr>
-          <p:cNvPr id="54" name="TextBox 53">
-            <a:extLst>
-              <a:ext uri="{FF2B5EF4-FFF2-40B4-BE49-F238E27FC236}">
-                <a16:creationId xmlns:a16="http://schemas.microsoft.com/office/drawing/2014/main" id="{2BC437A9-24EF-4164-96B3-D7D54499B0E6}"/>
-              </a:ext>
-            </a:extLst>
-          </p:cNvPr>
-          <p:cNvSpPr txBox="1"/>
-          <p:nvPr/>
-        </p:nvSpPr>
-        <p:spPr>
-          <a:xfrm>
-            <a:off x="3211157" y="5347460"/>
-            <a:ext cx="1348446" cy="400110"/>
-          </a:xfrm>
-          <a:prstGeom prst="rect">
-            <a:avLst/>
-          </a:prstGeom>
-          <a:noFill/>
-        </p:spPr>
-        <p:txBody>
-          <a:bodyPr wrap="none" rtlCol="0">
-            <a:spAutoFit/>
-          </a:bodyPr>
-          <a:lstStyle/>
-          <a:p>
-            <a:r>
-              <a:rPr lang="en-US" sz="1000" dirty="0"/>
-              <a:t>Speed, Torque, Temps</a:t>
-            </a:r>
-          </a:p>
-          <a:p>
-            <a:r>
-              <a:rPr lang="en-US" sz="1000" dirty="0"/>
-              <a:t>Voltages, Warnings</a:t>
-            </a:r>
-          </a:p>
-        </p:txBody>
-      </p:sp>
-      <p:sp>
-        <p:nvSpPr>
-          <p:cNvPr id="55" name="TextBox 54">
-            <a:extLst>
-              <a:ext uri="{FF2B5EF4-FFF2-40B4-BE49-F238E27FC236}">
-                <a16:creationId xmlns:a16="http://schemas.microsoft.com/office/drawing/2014/main" id="{E73C109B-2C86-401F-B0B8-0BE948DB559F}"/>
-              </a:ext>
-            </a:extLst>
-          </p:cNvPr>
-          <p:cNvSpPr txBox="1"/>
-          <p:nvPr/>
-        </p:nvSpPr>
-        <p:spPr>
-          <a:xfrm>
-            <a:off x="3233368" y="4054081"/>
-            <a:ext cx="1348446" cy="400110"/>
-          </a:xfrm>
-          <a:prstGeom prst="rect">
-            <a:avLst/>
-          </a:prstGeom>
-          <a:noFill/>
-        </p:spPr>
-        <p:txBody>
-          <a:bodyPr wrap="none" rtlCol="0">
-            <a:spAutoFit/>
-          </a:bodyPr>
-          <a:lstStyle/>
-          <a:p>
-            <a:r>
-              <a:rPr lang="en-US" sz="1000" dirty="0"/>
-              <a:t>Speed, Torque, Temps</a:t>
-            </a:r>
-          </a:p>
-          <a:p>
-            <a:r>
-              <a:rPr lang="en-US" sz="1000" dirty="0"/>
-              <a:t>Voltages, Warnings</a:t>
-            </a:r>
-          </a:p>
-        </p:txBody>
-      </p:sp>
-      <p:sp>
-        <p:nvSpPr>
-          <p:cNvPr id="56" name="Oval 55">
-            <a:extLst>
-              <a:ext uri="{FF2B5EF4-FFF2-40B4-BE49-F238E27FC236}">
-                <a16:creationId xmlns:a16="http://schemas.microsoft.com/office/drawing/2014/main" id="{6D6EEDD4-FC7E-4B01-A5E0-727A67836101}"/>
-              </a:ext>
-            </a:extLst>
-          </p:cNvPr>
-          <p:cNvSpPr/>
-          <p:nvPr/>
-        </p:nvSpPr>
-        <p:spPr>
-          <a:xfrm>
-            <a:off x="444512" y="2879199"/>
-            <a:ext cx="787684" cy="594632"/>
-          </a:xfrm>
-          <a:prstGeom prst="ellipse">
-            <a:avLst/>
-          </a:prstGeom>
-        </p:spPr>
-        <p:style>
-          <a:lnRef idx="2">
-            <a:schemeClr val="accent1"/>
-          </a:lnRef>
-          <a:fillRef idx="1">
-            <a:schemeClr val="lt1"/>
-          </a:fillRef>
-          <a:effectRef idx="0">
-            <a:schemeClr val="accent1"/>
-          </a:effectRef>
-          <a:fontRef idx="minor">
-            <a:schemeClr val="dk1"/>
-          </a:fontRef>
-        </p:style>
-        <p:txBody>
-          <a:bodyPr wrap="none" lIns="0" tIns="0" rIns="0" bIns="0" rtlCol="0" anchor="ctr"/>
-          <a:lstStyle/>
-          <a:p>
-            <a:pPr algn="ctr"/>
-            <a:r>
-              <a:rPr lang="en-US" sz="1000" dirty="0"/>
-              <a:t>Pumps and</a:t>
-            </a:r>
-          </a:p>
-          <a:p>
-            <a:pPr algn="ctr"/>
-            <a:r>
-              <a:rPr lang="en-US" sz="1000" dirty="0"/>
-              <a:t>Valves</a:t>
-            </a:r>
-          </a:p>
-        </p:txBody>
-      </p:sp>
-      <p:sp>
-        <p:nvSpPr>
-          <p:cNvPr id="57" name="Oval 56">
-            <a:extLst>
-              <a:ext uri="{FF2B5EF4-FFF2-40B4-BE49-F238E27FC236}">
-                <a16:creationId xmlns:a16="http://schemas.microsoft.com/office/drawing/2014/main" id="{EB9EFD36-19D8-4AF4-8E92-0B55E6CFFFC2}"/>
-              </a:ext>
-            </a:extLst>
-          </p:cNvPr>
-          <p:cNvSpPr/>
-          <p:nvPr/>
-        </p:nvSpPr>
-        <p:spPr>
-          <a:xfrm>
-            <a:off x="444512" y="3651819"/>
-            <a:ext cx="787684" cy="594632"/>
-          </a:xfrm>
-          <a:prstGeom prst="ellipse">
-            <a:avLst/>
-          </a:prstGeom>
-        </p:spPr>
-        <p:style>
-          <a:lnRef idx="2">
-            <a:schemeClr val="accent1"/>
-          </a:lnRef>
-          <a:fillRef idx="1">
-            <a:schemeClr val="lt1"/>
-          </a:fillRef>
-          <a:effectRef idx="0">
-            <a:schemeClr val="accent1"/>
-          </a:effectRef>
-          <a:fontRef idx="minor">
-            <a:schemeClr val="dk1"/>
-          </a:fontRef>
-        </p:style>
-        <p:txBody>
-          <a:bodyPr wrap="none" lIns="0" tIns="0" rIns="0" bIns="0" rtlCol="0" anchor="ctr"/>
-          <a:lstStyle/>
-          <a:p>
-            <a:pPr algn="ctr"/>
-            <a:r>
-              <a:rPr lang="en-US" sz="1000" dirty="0"/>
-              <a:t>AC</a:t>
-            </a:r>
-          </a:p>
-          <a:p>
-            <a:pPr algn="ctr"/>
-            <a:r>
-              <a:rPr lang="en-US" sz="1000" dirty="0"/>
-              <a:t>Compressor</a:t>
-            </a:r>
-          </a:p>
-        </p:txBody>
-      </p:sp>
-      <p:sp>
-        <p:nvSpPr>
-          <p:cNvPr id="58" name="Oval 57">
-            <a:extLst>
-              <a:ext uri="{FF2B5EF4-FFF2-40B4-BE49-F238E27FC236}">
-                <a16:creationId xmlns:a16="http://schemas.microsoft.com/office/drawing/2014/main" id="{771E0191-AC6E-4091-8E91-BA09160FAFA3}"/>
-              </a:ext>
-            </a:extLst>
-          </p:cNvPr>
-          <p:cNvSpPr/>
-          <p:nvPr/>
-        </p:nvSpPr>
-        <p:spPr>
-          <a:xfrm>
-            <a:off x="448669" y="4431365"/>
-            <a:ext cx="787684" cy="594632"/>
-          </a:xfrm>
-          <a:prstGeom prst="ellipse">
-            <a:avLst/>
-          </a:prstGeom>
-        </p:spPr>
-        <p:style>
-          <a:lnRef idx="2">
-            <a:schemeClr val="accent1"/>
-          </a:lnRef>
-          <a:fillRef idx="1">
-            <a:schemeClr val="lt1"/>
-          </a:fillRef>
-          <a:effectRef idx="0">
-            <a:schemeClr val="accent1"/>
-          </a:effectRef>
-          <a:fontRef idx="minor">
-            <a:schemeClr val="dk1"/>
-          </a:fontRef>
-        </p:style>
-        <p:txBody>
-          <a:bodyPr wrap="none" lIns="0" tIns="0" rIns="0" bIns="0" rtlCol="0" anchor="ctr"/>
-          <a:lstStyle/>
-          <a:p>
-            <a:pPr algn="ctr"/>
-            <a:r>
-              <a:rPr lang="en-US" sz="1000" dirty="0"/>
-              <a:t>Chiller &amp; </a:t>
-            </a:r>
-          </a:p>
-          <a:p>
-            <a:pPr algn="ctr"/>
-            <a:r>
-              <a:rPr lang="en-US" sz="1000" dirty="0"/>
-              <a:t>Heater</a:t>
-            </a:r>
-          </a:p>
-        </p:txBody>
-      </p:sp>
-      <p:cxnSp>
-        <p:nvCxnSpPr>
-          <p:cNvPr id="42" name="Connector: Elbow 41">
-            <a:extLst>
-              <a:ext uri="{FF2B5EF4-FFF2-40B4-BE49-F238E27FC236}">
-                <a16:creationId xmlns:a16="http://schemas.microsoft.com/office/drawing/2014/main" id="{6378F1D6-F74F-4AFF-B4F6-F0A53BF4B02D}"/>
-              </a:ext>
-            </a:extLst>
-          </p:cNvPr>
-          <p:cNvCxnSpPr>
-            <a:stCxn id="21" idx="1"/>
-            <a:endCxn id="58" idx="6"/>
-          </p:cNvCxnSpPr>
-          <p:nvPr/>
-        </p:nvCxnSpPr>
-        <p:spPr>
-          <a:xfrm rot="10800000" flipV="1">
-            <a:off x="1236353" y="4256069"/>
-            <a:ext cx="825328" cy="472611"/>
-          </a:xfrm>
-          <a:prstGeom prst="bentConnector3">
-            <a:avLst/>
-          </a:prstGeom>
-          <a:ln>
-            <a:tailEnd type="triangle"/>
-          </a:ln>
-        </p:spPr>
-        <p:style>
-          <a:lnRef idx="1">
-            <a:schemeClr val="accent1"/>
-          </a:lnRef>
-          <a:fillRef idx="0">
-            <a:schemeClr val="accent1"/>
-          </a:fillRef>
-          <a:effectRef idx="0">
-            <a:schemeClr val="accent1"/>
-          </a:effectRef>
-          <a:fontRef idx="minor">
-            <a:schemeClr val="tx1"/>
-          </a:fontRef>
-        </p:style>
-      </p:cxnSp>
-      <p:cxnSp>
-        <p:nvCxnSpPr>
-          <p:cNvPr id="60" name="Connector: Elbow 59">
-            <a:extLst>
-              <a:ext uri="{FF2B5EF4-FFF2-40B4-BE49-F238E27FC236}">
-                <a16:creationId xmlns:a16="http://schemas.microsoft.com/office/drawing/2014/main" id="{2664DC72-57C5-406C-9CAA-D4B5BF6A8AC7}"/>
-              </a:ext>
-            </a:extLst>
-          </p:cNvPr>
-          <p:cNvCxnSpPr>
-            <a:stCxn id="21" idx="1"/>
-            <a:endCxn id="57" idx="6"/>
-          </p:cNvCxnSpPr>
-          <p:nvPr/>
-        </p:nvCxnSpPr>
-        <p:spPr>
-          <a:xfrm rot="10800000">
-            <a:off x="1232197" y="3949136"/>
-            <a:ext cx="829485" cy="306935"/>
-          </a:xfrm>
-          <a:prstGeom prst="bentConnector3">
-            <a:avLst/>
-          </a:prstGeom>
-          <a:ln>
-            <a:tailEnd type="triangle"/>
-          </a:ln>
-        </p:spPr>
-        <p:style>
-          <a:lnRef idx="1">
-            <a:schemeClr val="accent1"/>
-          </a:lnRef>
-          <a:fillRef idx="0">
-            <a:schemeClr val="accent1"/>
-          </a:fillRef>
-          <a:effectRef idx="0">
-            <a:schemeClr val="accent1"/>
-          </a:effectRef>
-          <a:fontRef idx="minor">
-            <a:schemeClr val="tx1"/>
-          </a:fontRef>
-        </p:style>
-      </p:cxnSp>
-      <p:cxnSp>
-        <p:nvCxnSpPr>
-          <p:cNvPr id="62" name="Connector: Elbow 61">
-            <a:extLst>
-              <a:ext uri="{FF2B5EF4-FFF2-40B4-BE49-F238E27FC236}">
-                <a16:creationId xmlns:a16="http://schemas.microsoft.com/office/drawing/2014/main" id="{3AC739E7-2560-4191-8EA3-5D3D77FB87B7}"/>
-              </a:ext>
-            </a:extLst>
-          </p:cNvPr>
-          <p:cNvCxnSpPr>
-            <a:stCxn id="21" idx="1"/>
-            <a:endCxn id="56" idx="6"/>
-          </p:cNvCxnSpPr>
-          <p:nvPr/>
-        </p:nvCxnSpPr>
-        <p:spPr>
-          <a:xfrm rot="10800000">
-            <a:off x="1232197" y="3176516"/>
-            <a:ext cx="829485" cy="1079555"/>
-          </a:xfrm>
-          <a:prstGeom prst="bentConnector3">
-            <a:avLst/>
-          </a:prstGeom>
-          <a:ln>
-            <a:tailEnd type="triangle"/>
-          </a:ln>
-        </p:spPr>
-        <p:style>
-          <a:lnRef idx="1">
-            <a:schemeClr val="accent1"/>
-          </a:lnRef>
-          <a:fillRef idx="0">
-            <a:schemeClr val="accent1"/>
-          </a:fillRef>
-          <a:effectRef idx="0">
-            <a:schemeClr val="accent1"/>
-          </a:effectRef>
-          <a:fontRef idx="minor">
-            <a:schemeClr val="tx1"/>
-          </a:fontRef>
-        </p:style>
-      </p:cxnSp>
-      <p:sp>
-        <p:nvSpPr>
-          <p:cNvPr id="50" name="TextBox 49">
-            <a:extLst>
-              <a:ext uri="{FF2B5EF4-FFF2-40B4-BE49-F238E27FC236}">
-                <a16:creationId xmlns:a16="http://schemas.microsoft.com/office/drawing/2014/main" id="{FF330DD5-41E0-4068-89B1-4756388B4871}"/>
-              </a:ext>
-            </a:extLst>
-          </p:cNvPr>
-          <p:cNvSpPr txBox="1"/>
-          <p:nvPr/>
-        </p:nvSpPr>
-        <p:spPr>
-          <a:xfrm>
-            <a:off x="5522840" y="2158405"/>
-            <a:ext cx="439544" cy="246221"/>
-          </a:xfrm>
-          <a:prstGeom prst="rect">
-            <a:avLst/>
-          </a:prstGeom>
-          <a:noFill/>
-        </p:spPr>
-        <p:txBody>
-          <a:bodyPr wrap="none" rtlCol="0">
-            <a:spAutoFit/>
-          </a:bodyPr>
-          <a:lstStyle/>
-          <a:p>
-            <a:r>
-              <a:rPr lang="en-US" sz="1000" dirty="0"/>
-              <a:t>500k</a:t>
-            </a:r>
-          </a:p>
-        </p:txBody>
-      </p:sp>
-      <p:sp>
-        <p:nvSpPr>
-          <p:cNvPr id="59" name="TextBox 58">
-            <a:extLst>
-              <a:ext uri="{FF2B5EF4-FFF2-40B4-BE49-F238E27FC236}">
-                <a16:creationId xmlns:a16="http://schemas.microsoft.com/office/drawing/2014/main" id="{034BF4BF-C900-4851-8941-25CC94F2B5F3}"/>
-              </a:ext>
-            </a:extLst>
-          </p:cNvPr>
-          <p:cNvSpPr txBox="1"/>
-          <p:nvPr/>
-        </p:nvSpPr>
-        <p:spPr>
-          <a:xfrm>
-            <a:off x="5591984" y="3873829"/>
-            <a:ext cx="439544" cy="246221"/>
-          </a:xfrm>
-          <a:prstGeom prst="rect">
-            <a:avLst/>
-          </a:prstGeom>
-          <a:noFill/>
-        </p:spPr>
-        <p:txBody>
-          <a:bodyPr wrap="none" rtlCol="0">
-            <a:spAutoFit/>
-          </a:bodyPr>
-          <a:lstStyle/>
-          <a:p>
-            <a:r>
-              <a:rPr lang="en-US" sz="1000" dirty="0"/>
-              <a:t>500k</a:t>
+              <a:t>Control Lines</a:t>
             </a:r>
           </a:p>
         </p:txBody>

</xml_diff>